<commit_message>
Update powerpoint template with blue and red line at the bottom
</commit_message>
<xml_diff>
--- a/inst/quarto/ppt_template1.pptx
+++ b/inst/quarto/ppt_template1.pptx
@@ -229,7 +229,7 @@
           <a:p>
             <a:fld id="{2435C90A-F43F-4ABC-951D-BFBFB1AF96CB}" type="datetimeFigureOut">
               <a:rPr lang="de-CH" smtClean="0"/>
-              <a:t>03.06.2025</a:t>
+              <a:t>26.02.2026</a:t>
             </a:fld>
             <a:endParaRPr lang="de-CH"/>
           </a:p>
@@ -325,7 +325,7 @@
 </file>
 
 <file path=ppt/slideLayouts/slideLayout1.xml><?xml version="1.0" encoding="utf-8"?>
-<p:sldLayout xmlns:a="http://schemas.openxmlformats.org/drawingml/2006/main" xmlns:r="http://schemas.openxmlformats.org/officeDocument/2006/relationships" xmlns:p="http://schemas.openxmlformats.org/presentationml/2006/main" preserve="1" userDrawn="1">
+<p:sldLayout xmlns:a="http://schemas.openxmlformats.org/drawingml/2006/main" xmlns:r="http://schemas.openxmlformats.org/officeDocument/2006/relationships" xmlns:p="http://schemas.openxmlformats.org/presentationml/2006/main" showMasterSp="0" preserve="1" userDrawn="1">
   <p:cSld name="Title Slide">
     <p:spTree>
       <p:nvGrpSpPr>
@@ -1786,7 +1786,7 @@
 </file>
 
 <file path=ppt/slideLayouts/slideLayout3.xml><?xml version="1.0" encoding="utf-8"?>
-<p:sldLayout xmlns:a="http://schemas.openxmlformats.org/drawingml/2006/main" xmlns:r="http://schemas.openxmlformats.org/officeDocument/2006/relationships" xmlns:p="http://schemas.openxmlformats.org/presentationml/2006/main" preserve="1" userDrawn="1">
+<p:sldLayout xmlns:a="http://schemas.openxmlformats.org/drawingml/2006/main" xmlns:r="http://schemas.openxmlformats.org/officeDocument/2006/relationships" xmlns:p="http://schemas.openxmlformats.org/presentationml/2006/main" showMasterSp="0" preserve="1" userDrawn="1">
   <p:cSld name="Section Header">
     <p:spTree>
       <p:nvGrpSpPr>
@@ -5824,20 +5824,435 @@
           <a:bodyPr vert="horz" lIns="91440" tIns="45720" rIns="91440" bIns="45720" rtlCol="0" anchor="ctr"/>
           <a:lstStyle>
             <a:lvl1pPr algn="ctr">
-              <a:defRPr sz="900">
+              <a:defRPr sz="1200">
                 <a:solidFill>
                   <a:schemeClr val="tx1">
                     <a:tint val="75000"/>
                   </a:schemeClr>
                 </a:solidFill>
+                <a:latin typeface="Arial" panose="020B0604020202020204" pitchFamily="34" charset="0"/>
+                <a:cs typeface="Arial" panose="020B0604020202020204" pitchFamily="34" charset="0"/>
               </a:defRPr>
             </a:lvl1pPr>
           </a:lstStyle>
           <a:p>
-            <a:endParaRPr lang="en-US" dirty="0"/>
+            <a:endParaRPr lang="en-US" sz="1200" dirty="0"/>
           </a:p>
         </p:txBody>
       </p:sp>
+      <p:grpSp>
+        <p:nvGrpSpPr>
+          <p:cNvPr id="8" name="Group 7">
+            <a:extLst>
+              <a:ext uri="{FF2B5EF4-FFF2-40B4-BE49-F238E27FC236}">
+                <a16:creationId xmlns:a16="http://schemas.microsoft.com/office/drawing/2014/main" id="{07AED518-D582-9A4F-8C12-6E2C06E7A8AA}"/>
+              </a:ext>
+            </a:extLst>
+          </p:cNvPr>
+          <p:cNvGrpSpPr/>
+          <p:nvPr userDrawn="1"/>
+        </p:nvGrpSpPr>
+        <p:grpSpPr>
+          <a:xfrm>
+            <a:off x="0" y="5065182"/>
+            <a:ext cx="9144000" cy="78318"/>
+            <a:chOff x="0" y="5071254"/>
+            <a:chExt cx="9144000" cy="78318"/>
+          </a:xfrm>
+        </p:grpSpPr>
+        <p:sp>
+          <p:nvSpPr>
+            <p:cNvPr id="9" name="Rectangle 8">
+              <a:extLst>
+                <a:ext uri="{FF2B5EF4-FFF2-40B4-BE49-F238E27FC236}">
+                  <a16:creationId xmlns:a16="http://schemas.microsoft.com/office/drawing/2014/main" id="{2FFBD448-4703-CA48-88BE-FC90FC84C9BF}"/>
+                </a:ext>
+              </a:extLst>
+            </p:cNvPr>
+            <p:cNvSpPr/>
+            <p:nvPr userDrawn="1"/>
+          </p:nvSpPr>
+          <p:spPr>
+            <a:xfrm>
+              <a:off x="0" y="5071254"/>
+              <a:ext cx="2016000" cy="78318"/>
+            </a:xfrm>
+            <a:prstGeom prst="rect">
+              <a:avLst/>
+            </a:prstGeom>
+            <a:solidFill>
+              <a:srgbClr val="468AB2"/>
+            </a:solidFill>
+            <a:ln w="12700" cap="flat" cmpd="sng" algn="ctr">
+              <a:noFill/>
+              <a:prstDash val="solid"/>
+              <a:miter lim="800000"/>
+            </a:ln>
+            <a:effectLst/>
+          </p:spPr>
+          <p:txBody>
+            <a:bodyPr rtlCol="0" anchor="ctr"/>
+            <a:lstStyle>
+              <a:lvl1pPr defTabSz="363800">
+                <a:lnSpc>
+                  <a:spcPct val="93000"/>
+                </a:lnSpc>
+                <a:defRPr>
+                  <a:solidFill>
+                    <a:schemeClr val="lt1"/>
+                  </a:solidFill>
+                  <a:latin typeface="+mn-lt"/>
+                  <a:ea typeface="+mn-ea"/>
+                  <a:cs typeface="+mn-cs"/>
+                  <a:sym typeface="Calibri"/>
+                </a:defRPr>
+              </a:lvl1pPr>
+              <a:lvl2pPr indent="370225" defTabSz="363800">
+                <a:lnSpc>
+                  <a:spcPct val="93000"/>
+                </a:lnSpc>
+                <a:defRPr>
+                  <a:solidFill>
+                    <a:schemeClr val="lt1"/>
+                  </a:solidFill>
+                  <a:latin typeface="+mn-lt"/>
+                  <a:ea typeface="+mn-ea"/>
+                  <a:cs typeface="+mn-cs"/>
+                  <a:sym typeface="Calibri"/>
+                </a:defRPr>
+              </a:lvl2pPr>
+              <a:lvl3pPr indent="740451" defTabSz="363800">
+                <a:lnSpc>
+                  <a:spcPct val="93000"/>
+                </a:lnSpc>
+                <a:defRPr>
+                  <a:solidFill>
+                    <a:schemeClr val="lt1"/>
+                  </a:solidFill>
+                  <a:latin typeface="+mn-lt"/>
+                  <a:ea typeface="+mn-ea"/>
+                  <a:cs typeface="+mn-cs"/>
+                  <a:sym typeface="Calibri"/>
+                </a:defRPr>
+              </a:lvl3pPr>
+              <a:lvl4pPr indent="1110679" defTabSz="363800">
+                <a:lnSpc>
+                  <a:spcPct val="93000"/>
+                </a:lnSpc>
+                <a:defRPr>
+                  <a:solidFill>
+                    <a:schemeClr val="lt1"/>
+                  </a:solidFill>
+                  <a:latin typeface="+mn-lt"/>
+                  <a:ea typeface="+mn-ea"/>
+                  <a:cs typeface="+mn-cs"/>
+                  <a:sym typeface="Calibri"/>
+                </a:defRPr>
+              </a:lvl4pPr>
+              <a:lvl5pPr indent="1480905" defTabSz="363800">
+                <a:lnSpc>
+                  <a:spcPct val="93000"/>
+                </a:lnSpc>
+                <a:defRPr>
+                  <a:solidFill>
+                    <a:schemeClr val="lt1"/>
+                  </a:solidFill>
+                  <a:latin typeface="+mn-lt"/>
+                  <a:ea typeface="+mn-ea"/>
+                  <a:cs typeface="+mn-cs"/>
+                  <a:sym typeface="Calibri"/>
+                </a:defRPr>
+              </a:lvl5pPr>
+              <a:lvl6pPr indent="1851132" defTabSz="363800">
+                <a:lnSpc>
+                  <a:spcPct val="93000"/>
+                </a:lnSpc>
+                <a:defRPr>
+                  <a:solidFill>
+                    <a:schemeClr val="lt1"/>
+                  </a:solidFill>
+                  <a:latin typeface="+mn-lt"/>
+                  <a:ea typeface="+mn-ea"/>
+                  <a:cs typeface="+mn-cs"/>
+                  <a:sym typeface="Calibri"/>
+                </a:defRPr>
+              </a:lvl6pPr>
+              <a:lvl7pPr indent="2221358" defTabSz="363800">
+                <a:lnSpc>
+                  <a:spcPct val="93000"/>
+                </a:lnSpc>
+                <a:defRPr>
+                  <a:solidFill>
+                    <a:schemeClr val="lt1"/>
+                  </a:solidFill>
+                  <a:latin typeface="+mn-lt"/>
+                  <a:ea typeface="+mn-ea"/>
+                  <a:cs typeface="+mn-cs"/>
+                  <a:sym typeface="Calibri"/>
+                </a:defRPr>
+              </a:lvl7pPr>
+              <a:lvl8pPr indent="2591585" defTabSz="363800">
+                <a:lnSpc>
+                  <a:spcPct val="93000"/>
+                </a:lnSpc>
+                <a:defRPr>
+                  <a:solidFill>
+                    <a:schemeClr val="lt1"/>
+                  </a:solidFill>
+                  <a:latin typeface="+mn-lt"/>
+                  <a:ea typeface="+mn-ea"/>
+                  <a:cs typeface="+mn-cs"/>
+                  <a:sym typeface="Calibri"/>
+                </a:defRPr>
+              </a:lvl8pPr>
+              <a:lvl9pPr indent="2961812" defTabSz="363800">
+                <a:lnSpc>
+                  <a:spcPct val="93000"/>
+                </a:lnSpc>
+                <a:defRPr>
+                  <a:solidFill>
+                    <a:schemeClr val="lt1"/>
+                  </a:solidFill>
+                  <a:latin typeface="+mn-lt"/>
+                  <a:ea typeface="+mn-ea"/>
+                  <a:cs typeface="+mn-cs"/>
+                  <a:sym typeface="Calibri"/>
+                </a:defRPr>
+              </a:lvl9pPr>
+            </a:lstStyle>
+            <a:p>
+              <a:pPr marL="0" marR="0" lvl="0" indent="0" algn="ctr" defTabSz="363800" eaLnBrk="1" fontAlgn="auto" latinLnBrk="0" hangingPunct="1">
+                <a:lnSpc>
+                  <a:spcPct val="93000"/>
+                </a:lnSpc>
+                <a:spcBef>
+                  <a:spcPts val="0"/>
+                </a:spcBef>
+                <a:spcAft>
+                  <a:spcPts val="0"/>
+                </a:spcAft>
+                <a:buClrTx/>
+                <a:buSzTx/>
+                <a:buFontTx/>
+                <a:buNone/>
+                <a:tabLst/>
+                <a:defRPr/>
+              </a:pPr>
+              <a:endParaRPr kumimoji="0" lang="en-US" sz="1800" b="0" i="0" u="none" strike="noStrike" kern="0" cap="none" spc="0" normalizeH="0" baseline="0" noProof="0" dirty="0">
+                <a:ln>
+                  <a:noFill/>
+                </a:ln>
+                <a:solidFill>
+                  <a:srgbClr val="FFFFFF"/>
+                </a:solidFill>
+                <a:effectLst/>
+                <a:uLnTx/>
+                <a:uFillTx/>
+                <a:latin typeface="Simplon Norm" panose="020B0500030000000000" pitchFamily="34" charset="77"/>
+                <a:ea typeface="+mn-ea"/>
+                <a:cs typeface="+mn-cs"/>
+                <a:sym typeface="Calibri"/>
+              </a:endParaRPr>
+            </a:p>
+          </p:txBody>
+        </p:sp>
+        <p:sp>
+          <p:nvSpPr>
+            <p:cNvPr id="10" name="Rectangle 9">
+              <a:extLst>
+                <a:ext uri="{FF2B5EF4-FFF2-40B4-BE49-F238E27FC236}">
+                  <a16:creationId xmlns:a16="http://schemas.microsoft.com/office/drawing/2014/main" id="{91480782-CDA4-E241-80E9-8887C60CB37B}"/>
+                </a:ext>
+              </a:extLst>
+            </p:cNvPr>
+            <p:cNvSpPr/>
+            <p:nvPr userDrawn="1"/>
+          </p:nvSpPr>
+          <p:spPr>
+            <a:xfrm>
+              <a:off x="2016000" y="5071254"/>
+              <a:ext cx="7128000" cy="78318"/>
+            </a:xfrm>
+            <a:prstGeom prst="rect">
+              <a:avLst/>
+            </a:prstGeom>
+            <a:solidFill>
+              <a:srgbClr val="BF3227"/>
+            </a:solidFill>
+            <a:ln w="12700" cap="flat" cmpd="sng" algn="ctr">
+              <a:noFill/>
+              <a:prstDash val="solid"/>
+              <a:miter lim="800000"/>
+            </a:ln>
+            <a:effectLst/>
+          </p:spPr>
+          <p:txBody>
+            <a:bodyPr rtlCol="0" anchor="ctr"/>
+            <a:lstStyle>
+              <a:lvl1pPr defTabSz="363800">
+                <a:lnSpc>
+                  <a:spcPct val="93000"/>
+                </a:lnSpc>
+                <a:defRPr>
+                  <a:solidFill>
+                    <a:schemeClr val="lt1"/>
+                  </a:solidFill>
+                  <a:latin typeface="+mn-lt"/>
+                  <a:ea typeface="+mn-ea"/>
+                  <a:cs typeface="+mn-cs"/>
+                  <a:sym typeface="Calibri"/>
+                </a:defRPr>
+              </a:lvl1pPr>
+              <a:lvl2pPr indent="370225" defTabSz="363800">
+                <a:lnSpc>
+                  <a:spcPct val="93000"/>
+                </a:lnSpc>
+                <a:defRPr>
+                  <a:solidFill>
+                    <a:schemeClr val="lt1"/>
+                  </a:solidFill>
+                  <a:latin typeface="+mn-lt"/>
+                  <a:ea typeface="+mn-ea"/>
+                  <a:cs typeface="+mn-cs"/>
+                  <a:sym typeface="Calibri"/>
+                </a:defRPr>
+              </a:lvl2pPr>
+              <a:lvl3pPr indent="740451" defTabSz="363800">
+                <a:lnSpc>
+                  <a:spcPct val="93000"/>
+                </a:lnSpc>
+                <a:defRPr>
+                  <a:solidFill>
+                    <a:schemeClr val="lt1"/>
+                  </a:solidFill>
+                  <a:latin typeface="+mn-lt"/>
+                  <a:ea typeface="+mn-ea"/>
+                  <a:cs typeface="+mn-cs"/>
+                  <a:sym typeface="Calibri"/>
+                </a:defRPr>
+              </a:lvl3pPr>
+              <a:lvl4pPr indent="1110679" defTabSz="363800">
+                <a:lnSpc>
+                  <a:spcPct val="93000"/>
+                </a:lnSpc>
+                <a:defRPr>
+                  <a:solidFill>
+                    <a:schemeClr val="lt1"/>
+                  </a:solidFill>
+                  <a:latin typeface="+mn-lt"/>
+                  <a:ea typeface="+mn-ea"/>
+                  <a:cs typeface="+mn-cs"/>
+                  <a:sym typeface="Calibri"/>
+                </a:defRPr>
+              </a:lvl4pPr>
+              <a:lvl5pPr indent="1480905" defTabSz="363800">
+                <a:lnSpc>
+                  <a:spcPct val="93000"/>
+                </a:lnSpc>
+                <a:defRPr>
+                  <a:solidFill>
+                    <a:schemeClr val="lt1"/>
+                  </a:solidFill>
+                  <a:latin typeface="+mn-lt"/>
+                  <a:ea typeface="+mn-ea"/>
+                  <a:cs typeface="+mn-cs"/>
+                  <a:sym typeface="Calibri"/>
+                </a:defRPr>
+              </a:lvl5pPr>
+              <a:lvl6pPr indent="1851132" defTabSz="363800">
+                <a:lnSpc>
+                  <a:spcPct val="93000"/>
+                </a:lnSpc>
+                <a:defRPr>
+                  <a:solidFill>
+                    <a:schemeClr val="lt1"/>
+                  </a:solidFill>
+                  <a:latin typeface="+mn-lt"/>
+                  <a:ea typeface="+mn-ea"/>
+                  <a:cs typeface="+mn-cs"/>
+                  <a:sym typeface="Calibri"/>
+                </a:defRPr>
+              </a:lvl6pPr>
+              <a:lvl7pPr indent="2221358" defTabSz="363800">
+                <a:lnSpc>
+                  <a:spcPct val="93000"/>
+                </a:lnSpc>
+                <a:defRPr>
+                  <a:solidFill>
+                    <a:schemeClr val="lt1"/>
+                  </a:solidFill>
+                  <a:latin typeface="+mn-lt"/>
+                  <a:ea typeface="+mn-ea"/>
+                  <a:cs typeface="+mn-cs"/>
+                  <a:sym typeface="Calibri"/>
+                </a:defRPr>
+              </a:lvl7pPr>
+              <a:lvl8pPr indent="2591585" defTabSz="363800">
+                <a:lnSpc>
+                  <a:spcPct val="93000"/>
+                </a:lnSpc>
+                <a:defRPr>
+                  <a:solidFill>
+                    <a:schemeClr val="lt1"/>
+                  </a:solidFill>
+                  <a:latin typeface="+mn-lt"/>
+                  <a:ea typeface="+mn-ea"/>
+                  <a:cs typeface="+mn-cs"/>
+                  <a:sym typeface="Calibri"/>
+                </a:defRPr>
+              </a:lvl8pPr>
+              <a:lvl9pPr indent="2961812" defTabSz="363800">
+                <a:lnSpc>
+                  <a:spcPct val="93000"/>
+                </a:lnSpc>
+                <a:defRPr>
+                  <a:solidFill>
+                    <a:schemeClr val="lt1"/>
+                  </a:solidFill>
+                  <a:latin typeface="+mn-lt"/>
+                  <a:ea typeface="+mn-ea"/>
+                  <a:cs typeface="+mn-cs"/>
+                  <a:sym typeface="Calibri"/>
+                </a:defRPr>
+              </a:lvl9pPr>
+            </a:lstStyle>
+            <a:p>
+              <a:pPr marL="0" marR="0" lvl="0" indent="0" algn="ctr" defTabSz="363800" eaLnBrk="1" fontAlgn="auto" latinLnBrk="0" hangingPunct="1">
+                <a:lnSpc>
+                  <a:spcPct val="93000"/>
+                </a:lnSpc>
+                <a:spcBef>
+                  <a:spcPts val="0"/>
+                </a:spcBef>
+                <a:spcAft>
+                  <a:spcPts val="0"/>
+                </a:spcAft>
+                <a:buClrTx/>
+                <a:buSzTx/>
+                <a:buFontTx/>
+                <a:buNone/>
+                <a:tabLst/>
+                <a:defRPr/>
+              </a:pPr>
+              <a:endParaRPr kumimoji="0" lang="en-US" sz="1800" b="0" i="0" u="none" strike="noStrike" kern="0" cap="none" spc="0" normalizeH="0" baseline="0" noProof="0" dirty="0">
+                <a:ln>
+                  <a:noFill/>
+                </a:ln>
+                <a:solidFill>
+                  <a:srgbClr val="FFFFFF"/>
+                </a:solidFill>
+                <a:effectLst/>
+                <a:uLnTx/>
+                <a:uFillTx/>
+                <a:latin typeface="Simplon Norm" panose="020B0500030000000000" pitchFamily="34" charset="77"/>
+                <a:ea typeface="+mn-ea"/>
+                <a:cs typeface="+mn-cs"/>
+                <a:sym typeface="Calibri"/>
+              </a:endParaRPr>
+            </a:p>
+          </p:txBody>
+        </p:sp>
+      </p:grpSp>
     </p:spTree>
     <p:extLst>
       <p:ext uri="{BB962C8B-B14F-4D97-AF65-F5344CB8AC3E}">

</xml_diff>